<commit_message>
Added names to the presentation
</commit_message>
<xml_diff>
--- a/Entwurf/Entwurf Präsentation.pptx
+++ b/Entwurf/Entwurf Präsentation.pptx
@@ -282,7 +282,7 @@
           <a:p>
             <a:fld id="{D4A7F7FB-B369-497A-97C2-098805D1A52E}" type="datetimeFigureOut">
               <a:rPr lang="de-DE" smtClean="0"/>
-              <a:t>02.01.2022</a:t>
+              <a:t>04.01.22</a:t>
             </a:fld>
             <a:endParaRPr lang="de-DE"/>
           </a:p>
@@ -336,7 +336,7 @@
           <a:p>
             <a:fld id="{16A78056-7FAF-464B-A14F-848C7FC2BB44}" type="slidenum">
               <a:rPr lang="de-DE" smtClean="0"/>
-              <a:t>‹#›</a:t>
+              <a:t>‹Nr.›</a:t>
             </a:fld>
             <a:endParaRPr lang="de-DE"/>
           </a:p>
@@ -482,7 +482,7 @@
           <a:p>
             <a:fld id="{D4A7F7FB-B369-497A-97C2-098805D1A52E}" type="datetimeFigureOut">
               <a:rPr lang="de-DE" smtClean="0"/>
-              <a:t>02.01.2022</a:t>
+              <a:t>04.01.22</a:t>
             </a:fld>
             <a:endParaRPr lang="de-DE"/>
           </a:p>
@@ -536,7 +536,7 @@
           <a:p>
             <a:fld id="{16A78056-7FAF-464B-A14F-848C7FC2BB44}" type="slidenum">
               <a:rPr lang="de-DE" smtClean="0"/>
-              <a:t>‹#›</a:t>
+              <a:t>‹Nr.›</a:t>
             </a:fld>
             <a:endParaRPr lang="de-DE"/>
           </a:p>
@@ -692,7 +692,7 @@
           <a:p>
             <a:fld id="{D4A7F7FB-B369-497A-97C2-098805D1A52E}" type="datetimeFigureOut">
               <a:rPr lang="de-DE" smtClean="0"/>
-              <a:t>02.01.2022</a:t>
+              <a:t>04.01.22</a:t>
             </a:fld>
             <a:endParaRPr lang="de-DE"/>
           </a:p>
@@ -746,7 +746,7 @@
           <a:p>
             <a:fld id="{16A78056-7FAF-464B-A14F-848C7FC2BB44}" type="slidenum">
               <a:rPr lang="de-DE" smtClean="0"/>
-              <a:t>‹#›</a:t>
+              <a:t>‹Nr.›</a:t>
             </a:fld>
             <a:endParaRPr lang="de-DE"/>
           </a:p>
@@ -961,7 +961,7 @@
           <a:p>
             <a:fld id="{D4A7F7FB-B369-497A-97C2-098805D1A52E}" type="datetimeFigureOut">
               <a:rPr lang="de-DE" smtClean="0"/>
-              <a:t>02.01.2022</a:t>
+              <a:t>04.01.22</a:t>
             </a:fld>
             <a:endParaRPr lang="de-DE"/>
           </a:p>
@@ -1003,7 +1003,7 @@
           <a:p>
             <a:fld id="{16A78056-7FAF-464B-A14F-848C7FC2BB44}" type="slidenum">
               <a:rPr lang="de-DE" smtClean="0"/>
-              <a:t>‹#›</a:t>
+              <a:t>‹Nr.›</a:t>
             </a:fld>
             <a:endParaRPr lang="de-DE"/>
           </a:p>
@@ -1131,7 +1131,7 @@
           <a:p>
             <a:fld id="{D4A7F7FB-B369-497A-97C2-098805D1A52E}" type="datetimeFigureOut">
               <a:rPr lang="de-DE" smtClean="0"/>
-              <a:t>02.01.2022</a:t>
+              <a:t>04.01.22</a:t>
             </a:fld>
             <a:endParaRPr lang="de-DE"/>
           </a:p>
@@ -1173,7 +1173,7 @@
           <a:p>
             <a:fld id="{16A78056-7FAF-464B-A14F-848C7FC2BB44}" type="slidenum">
               <a:rPr lang="de-DE" smtClean="0"/>
-              <a:t>‹#›</a:t>
+              <a:t>‹Nr.›</a:t>
             </a:fld>
             <a:endParaRPr lang="de-DE"/>
           </a:p>
@@ -1388,7 +1388,7 @@
           <a:p>
             <a:fld id="{D4A7F7FB-B369-497A-97C2-098805D1A52E}" type="datetimeFigureOut">
               <a:rPr lang="de-DE" smtClean="0"/>
-              <a:t>02.01.2022</a:t>
+              <a:t>04.01.22</a:t>
             </a:fld>
             <a:endParaRPr lang="de-DE"/>
           </a:p>
@@ -1430,7 +1430,7 @@
           <a:p>
             <a:fld id="{16A78056-7FAF-464B-A14F-848C7FC2BB44}" type="slidenum">
               <a:rPr lang="de-DE" smtClean="0"/>
-              <a:t>‹#›</a:t>
+              <a:t>‹Nr.›</a:t>
             </a:fld>
             <a:endParaRPr lang="de-DE"/>
           </a:p>
@@ -1620,7 +1620,7 @@
           <a:p>
             <a:fld id="{D4A7F7FB-B369-497A-97C2-098805D1A52E}" type="datetimeFigureOut">
               <a:rPr lang="de-DE" smtClean="0"/>
-              <a:t>02.01.2022</a:t>
+              <a:t>04.01.22</a:t>
             </a:fld>
             <a:endParaRPr lang="de-DE"/>
           </a:p>
@@ -1662,7 +1662,7 @@
           <a:p>
             <a:fld id="{16A78056-7FAF-464B-A14F-848C7FC2BB44}" type="slidenum">
               <a:rPr lang="de-DE" smtClean="0"/>
-              <a:t>‹#›</a:t>
+              <a:t>‹Nr.›</a:t>
             </a:fld>
             <a:endParaRPr lang="de-DE"/>
           </a:p>
@@ -2013,7 +2013,7 @@
           <a:p>
             <a:fld id="{D4A7F7FB-B369-497A-97C2-098805D1A52E}" type="datetimeFigureOut">
               <a:rPr lang="de-DE" smtClean="0"/>
-              <a:t>02.01.2022</a:t>
+              <a:t>04.01.22</a:t>
             </a:fld>
             <a:endParaRPr lang="de-DE"/>
           </a:p>
@@ -2055,7 +2055,7 @@
           <a:p>
             <a:fld id="{16A78056-7FAF-464B-A14F-848C7FC2BB44}" type="slidenum">
               <a:rPr lang="de-DE" smtClean="0"/>
-              <a:t>‹#›</a:t>
+              <a:t>‹Nr.›</a:t>
             </a:fld>
             <a:endParaRPr lang="de-DE"/>
           </a:p>
@@ -2131,7 +2131,7 @@
           <a:p>
             <a:fld id="{D4A7F7FB-B369-497A-97C2-098805D1A52E}" type="datetimeFigureOut">
               <a:rPr lang="de-DE" smtClean="0"/>
-              <a:t>02.01.2022</a:t>
+              <a:t>04.01.22</a:t>
             </a:fld>
             <a:endParaRPr lang="de-DE"/>
           </a:p>
@@ -2173,7 +2173,7 @@
           <a:p>
             <a:fld id="{16A78056-7FAF-464B-A14F-848C7FC2BB44}" type="slidenum">
               <a:rPr lang="de-DE" smtClean="0"/>
-              <a:t>‹#›</a:t>
+              <a:t>‹Nr.›</a:t>
             </a:fld>
             <a:endParaRPr lang="de-DE"/>
           </a:p>
@@ -2226,7 +2226,7 @@
           <a:p>
             <a:fld id="{D4A7F7FB-B369-497A-97C2-098805D1A52E}" type="datetimeFigureOut">
               <a:rPr lang="de-DE" smtClean="0"/>
-              <a:t>02.01.2022</a:t>
+              <a:t>04.01.22</a:t>
             </a:fld>
             <a:endParaRPr lang="de-DE"/>
           </a:p>
@@ -2268,7 +2268,7 @@
           <a:p>
             <a:fld id="{16A78056-7FAF-464B-A14F-848C7FC2BB44}" type="slidenum">
               <a:rPr lang="de-DE" smtClean="0"/>
-              <a:t>‹#›</a:t>
+              <a:t>‹Nr.›</a:t>
             </a:fld>
             <a:endParaRPr lang="de-DE"/>
           </a:p>
@@ -2499,7 +2499,7 @@
           <a:p>
             <a:fld id="{D4A7F7FB-B369-497A-97C2-098805D1A52E}" type="datetimeFigureOut">
               <a:rPr lang="de-DE" smtClean="0"/>
-              <a:t>02.01.2022</a:t>
+              <a:t>04.01.22</a:t>
             </a:fld>
             <a:endParaRPr lang="de-DE"/>
           </a:p>
@@ -2541,7 +2541,7 @@
           <a:p>
             <a:fld id="{16A78056-7FAF-464B-A14F-848C7FC2BB44}" type="slidenum">
               <a:rPr lang="de-DE" smtClean="0"/>
-              <a:t>‹#›</a:t>
+              <a:t>‹Nr.›</a:t>
             </a:fld>
             <a:endParaRPr lang="de-DE"/>
           </a:p>
@@ -2687,7 +2687,7 @@
           <a:p>
             <a:fld id="{D4A7F7FB-B369-497A-97C2-098805D1A52E}" type="datetimeFigureOut">
               <a:rPr lang="de-DE" smtClean="0"/>
-              <a:t>02.01.2022</a:t>
+              <a:t>04.01.22</a:t>
             </a:fld>
             <a:endParaRPr lang="de-DE"/>
           </a:p>
@@ -2741,7 +2741,7 @@
           <a:p>
             <a:fld id="{16A78056-7FAF-464B-A14F-848C7FC2BB44}" type="slidenum">
               <a:rPr lang="de-DE" smtClean="0"/>
-              <a:t>‹#›</a:t>
+              <a:t>‹Nr.›</a:t>
             </a:fld>
             <a:endParaRPr lang="de-DE"/>
           </a:p>
@@ -2980,7 +2980,7 @@
           <a:p>
             <a:fld id="{D4A7F7FB-B369-497A-97C2-098805D1A52E}" type="datetimeFigureOut">
               <a:rPr lang="de-DE" smtClean="0"/>
-              <a:t>02.01.2022</a:t>
+              <a:t>04.01.22</a:t>
             </a:fld>
             <a:endParaRPr lang="de-DE"/>
           </a:p>
@@ -3022,7 +3022,7 @@
           <a:p>
             <a:fld id="{16A78056-7FAF-464B-A14F-848C7FC2BB44}" type="slidenum">
               <a:rPr lang="de-DE" smtClean="0"/>
-              <a:t>‹#›</a:t>
+              <a:t>‹Nr.›</a:t>
             </a:fld>
             <a:endParaRPr lang="de-DE"/>
           </a:p>
@@ -3261,7 +3261,7 @@
           <a:p>
             <a:fld id="{D4A7F7FB-B369-497A-97C2-098805D1A52E}" type="datetimeFigureOut">
               <a:rPr lang="de-DE" smtClean="0"/>
-              <a:t>02.01.2022</a:t>
+              <a:t>04.01.22</a:t>
             </a:fld>
             <a:endParaRPr lang="de-DE"/>
           </a:p>
@@ -3303,7 +3303,7 @@
           <a:p>
             <a:fld id="{16A78056-7FAF-464B-A14F-848C7FC2BB44}" type="slidenum">
               <a:rPr lang="de-DE" smtClean="0"/>
-              <a:t>‹#›</a:t>
+              <a:t>‹Nr.›</a:t>
             </a:fld>
             <a:endParaRPr lang="de-DE"/>
           </a:p>
@@ -3453,7 +3453,7 @@
           <a:p>
             <a:fld id="{D4A7F7FB-B369-497A-97C2-098805D1A52E}" type="datetimeFigureOut">
               <a:rPr lang="de-DE" smtClean="0"/>
-              <a:t>02.01.2022</a:t>
+              <a:t>04.01.22</a:t>
             </a:fld>
             <a:endParaRPr lang="de-DE"/>
           </a:p>
@@ -3495,7 +3495,7 @@
           <a:p>
             <a:fld id="{16A78056-7FAF-464B-A14F-848C7FC2BB44}" type="slidenum">
               <a:rPr lang="de-DE" smtClean="0"/>
-              <a:t>‹#›</a:t>
+              <a:t>‹Nr.›</a:t>
             </a:fld>
             <a:endParaRPr lang="de-DE"/>
           </a:p>
@@ -3714,7 +3714,7 @@
           <a:p>
             <a:fld id="{D4A7F7FB-B369-497A-97C2-098805D1A52E}" type="datetimeFigureOut">
               <a:rPr lang="de-DE" smtClean="0"/>
-              <a:t>02.01.2022</a:t>
+              <a:t>04.01.22</a:t>
             </a:fld>
             <a:endParaRPr lang="de-DE"/>
           </a:p>
@@ -3756,7 +3756,7 @@
           <a:p>
             <a:fld id="{16A78056-7FAF-464B-A14F-848C7FC2BB44}" type="slidenum">
               <a:rPr lang="de-DE" smtClean="0"/>
-              <a:t>‹#›</a:t>
+              <a:t>‹Nr.›</a:t>
             </a:fld>
             <a:endParaRPr lang="de-DE"/>
           </a:p>
@@ -4140,7 +4140,7 @@
           <a:p>
             <a:fld id="{D4A7F7FB-B369-497A-97C2-098805D1A52E}" type="datetimeFigureOut">
               <a:rPr lang="de-DE" smtClean="0"/>
-              <a:t>02.01.2022</a:t>
+              <a:t>04.01.22</a:t>
             </a:fld>
             <a:endParaRPr lang="de-DE"/>
           </a:p>
@@ -4182,7 +4182,7 @@
           <a:p>
             <a:fld id="{16A78056-7FAF-464B-A14F-848C7FC2BB44}" type="slidenum">
               <a:rPr lang="de-DE" smtClean="0"/>
-              <a:t>‹#›</a:t>
+              <a:t>‹Nr.›</a:t>
             </a:fld>
             <a:endParaRPr lang="de-DE"/>
           </a:p>
@@ -4686,7 +4686,7 @@
           <a:p>
             <a:fld id="{D4A7F7FB-B369-497A-97C2-098805D1A52E}" type="datetimeFigureOut">
               <a:rPr lang="de-DE" smtClean="0"/>
-              <a:t>02.01.2022</a:t>
+              <a:t>04.01.22</a:t>
             </a:fld>
             <a:endParaRPr lang="de-DE"/>
           </a:p>
@@ -4728,7 +4728,7 @@
           <a:p>
             <a:fld id="{16A78056-7FAF-464B-A14F-848C7FC2BB44}" type="slidenum">
               <a:rPr lang="de-DE" smtClean="0"/>
-              <a:t>‹#›</a:t>
+              <a:t>‹Nr.›</a:t>
             </a:fld>
             <a:endParaRPr lang="de-DE"/>
           </a:p>
@@ -5517,7 +5517,7 @@
           <a:p>
             <a:fld id="{D4A7F7FB-B369-497A-97C2-098805D1A52E}" type="datetimeFigureOut">
               <a:rPr lang="de-DE" smtClean="0"/>
-              <a:t>02.01.2022</a:t>
+              <a:t>04.01.22</a:t>
             </a:fld>
             <a:endParaRPr lang="de-DE"/>
           </a:p>
@@ -5559,7 +5559,7 @@
           <a:p>
             <a:fld id="{16A78056-7FAF-464B-A14F-848C7FC2BB44}" type="slidenum">
               <a:rPr lang="de-DE" smtClean="0"/>
-              <a:t>‹#›</a:t>
+              <a:t>‹Nr.›</a:t>
             </a:fld>
             <a:endParaRPr lang="de-DE"/>
           </a:p>
@@ -5687,7 +5687,7 @@
           <a:p>
             <a:fld id="{D4A7F7FB-B369-497A-97C2-098805D1A52E}" type="datetimeFigureOut">
               <a:rPr lang="de-DE" smtClean="0"/>
-              <a:t>02.01.2022</a:t>
+              <a:t>04.01.22</a:t>
             </a:fld>
             <a:endParaRPr lang="de-DE"/>
           </a:p>
@@ -5729,7 +5729,7 @@
           <a:p>
             <a:fld id="{16A78056-7FAF-464B-A14F-848C7FC2BB44}" type="slidenum">
               <a:rPr lang="de-DE" smtClean="0"/>
-              <a:t>‹#›</a:t>
+              <a:t>‹Nr.›</a:t>
             </a:fld>
             <a:endParaRPr lang="de-DE"/>
           </a:p>
@@ -5867,7 +5867,7 @@
           <a:p>
             <a:fld id="{D4A7F7FB-B369-497A-97C2-098805D1A52E}" type="datetimeFigureOut">
               <a:rPr lang="de-DE" smtClean="0"/>
-              <a:t>02.01.2022</a:t>
+              <a:t>04.01.22</a:t>
             </a:fld>
             <a:endParaRPr lang="de-DE"/>
           </a:p>
@@ -5909,7 +5909,7 @@
           <a:p>
             <a:fld id="{16A78056-7FAF-464B-A14F-848C7FC2BB44}" type="slidenum">
               <a:rPr lang="de-DE" smtClean="0"/>
-              <a:t>‹#›</a:t>
+              <a:t>‹Nr.›</a:t>
             </a:fld>
             <a:endParaRPr lang="de-DE"/>
           </a:p>
@@ -6131,7 +6131,7 @@
           <a:p>
             <a:fld id="{D4A7F7FB-B369-497A-97C2-098805D1A52E}" type="datetimeFigureOut">
               <a:rPr lang="de-DE" smtClean="0"/>
-              <a:t>02.01.2022</a:t>
+              <a:t>04.01.22</a:t>
             </a:fld>
             <a:endParaRPr lang="de-DE"/>
           </a:p>
@@ -6185,7 +6185,7 @@
           <a:p>
             <a:fld id="{16A78056-7FAF-464B-A14F-848C7FC2BB44}" type="slidenum">
               <a:rPr lang="de-DE" smtClean="0"/>
-              <a:t>‹#›</a:t>
+              <a:t>‹Nr.›</a:t>
             </a:fld>
             <a:endParaRPr lang="de-DE"/>
           </a:p>
@@ -6399,7 +6399,7 @@
           <a:p>
             <a:fld id="{D4A7F7FB-B369-497A-97C2-098805D1A52E}" type="datetimeFigureOut">
               <a:rPr lang="de-DE" smtClean="0"/>
-              <a:t>02.01.2022</a:t>
+              <a:t>04.01.22</a:t>
             </a:fld>
             <a:endParaRPr lang="de-DE"/>
           </a:p>
@@ -6453,7 +6453,7 @@
           <a:p>
             <a:fld id="{16A78056-7FAF-464B-A14F-848C7FC2BB44}" type="slidenum">
               <a:rPr lang="de-DE" smtClean="0"/>
-              <a:t>‹#›</a:t>
+              <a:t>‹Nr.›</a:t>
             </a:fld>
             <a:endParaRPr lang="de-DE"/>
           </a:p>
@@ -6814,7 +6814,7 @@
           <a:p>
             <a:fld id="{D4A7F7FB-B369-497A-97C2-098805D1A52E}" type="datetimeFigureOut">
               <a:rPr lang="de-DE" smtClean="0"/>
-              <a:t>02.01.2022</a:t>
+              <a:t>04.01.22</a:t>
             </a:fld>
             <a:endParaRPr lang="de-DE"/>
           </a:p>
@@ -6868,7 +6868,7 @@
           <a:p>
             <a:fld id="{16A78056-7FAF-464B-A14F-848C7FC2BB44}" type="slidenum">
               <a:rPr lang="de-DE" smtClean="0"/>
-              <a:t>‹#›</a:t>
+              <a:t>‹Nr.›</a:t>
             </a:fld>
             <a:endParaRPr lang="de-DE"/>
           </a:p>
@@ -6956,7 +6956,7 @@
           <a:p>
             <a:fld id="{D4A7F7FB-B369-497A-97C2-098805D1A52E}" type="datetimeFigureOut">
               <a:rPr lang="de-DE" smtClean="0"/>
-              <a:t>02.01.2022</a:t>
+              <a:t>04.01.22</a:t>
             </a:fld>
             <a:endParaRPr lang="de-DE"/>
           </a:p>
@@ -7010,7 +7010,7 @@
           <a:p>
             <a:fld id="{16A78056-7FAF-464B-A14F-848C7FC2BB44}" type="slidenum">
               <a:rPr lang="de-DE" smtClean="0"/>
-              <a:t>‹#›</a:t>
+              <a:t>‹Nr.›</a:t>
             </a:fld>
             <a:endParaRPr lang="de-DE"/>
           </a:p>
@@ -7069,7 +7069,7 @@
           <a:p>
             <a:fld id="{D4A7F7FB-B369-497A-97C2-098805D1A52E}" type="datetimeFigureOut">
               <a:rPr lang="de-DE" smtClean="0"/>
-              <a:t>02.01.2022</a:t>
+              <a:t>04.01.22</a:t>
             </a:fld>
             <a:endParaRPr lang="de-DE"/>
           </a:p>
@@ -7123,7 +7123,7 @@
           <a:p>
             <a:fld id="{16A78056-7FAF-464B-A14F-848C7FC2BB44}" type="slidenum">
               <a:rPr lang="de-DE" smtClean="0"/>
-              <a:t>‹#›</a:t>
+              <a:t>‹Nr.›</a:t>
             </a:fld>
             <a:endParaRPr lang="de-DE"/>
           </a:p>
@@ -7382,7 +7382,7 @@
           <a:p>
             <a:fld id="{D4A7F7FB-B369-497A-97C2-098805D1A52E}" type="datetimeFigureOut">
               <a:rPr lang="de-DE" smtClean="0"/>
-              <a:t>02.01.2022</a:t>
+              <a:t>04.01.22</a:t>
             </a:fld>
             <a:endParaRPr lang="de-DE"/>
           </a:p>
@@ -7436,7 +7436,7 @@
           <a:p>
             <a:fld id="{16A78056-7FAF-464B-A14F-848C7FC2BB44}" type="slidenum">
               <a:rPr lang="de-DE" smtClean="0"/>
-              <a:t>‹#›</a:t>
+              <a:t>‹Nr.›</a:t>
             </a:fld>
             <a:endParaRPr lang="de-DE"/>
           </a:p>
@@ -7671,7 +7671,7 @@
           <a:p>
             <a:fld id="{D4A7F7FB-B369-497A-97C2-098805D1A52E}" type="datetimeFigureOut">
               <a:rPr lang="de-DE" smtClean="0"/>
-              <a:t>02.01.2022</a:t>
+              <a:t>04.01.22</a:t>
             </a:fld>
             <a:endParaRPr lang="de-DE"/>
           </a:p>
@@ -7725,7 +7725,7 @@
           <a:p>
             <a:fld id="{16A78056-7FAF-464B-A14F-848C7FC2BB44}" type="slidenum">
               <a:rPr lang="de-DE" smtClean="0"/>
-              <a:t>‹#›</a:t>
+              <a:t>‹Nr.›</a:t>
             </a:fld>
             <a:endParaRPr lang="de-DE"/>
           </a:p>
@@ -7914,7 +7914,7 @@
           <a:p>
             <a:fld id="{D4A7F7FB-B369-497A-97C2-098805D1A52E}" type="datetimeFigureOut">
               <a:rPr lang="de-DE" smtClean="0"/>
-              <a:t>02.01.2022</a:t>
+              <a:t>04.01.22</a:t>
             </a:fld>
             <a:endParaRPr lang="de-DE"/>
           </a:p>
@@ -8004,7 +8004,7 @@
           <a:p>
             <a:fld id="{16A78056-7FAF-464B-A14F-848C7FC2BB44}" type="slidenum">
               <a:rPr lang="de-DE" smtClean="0"/>
-              <a:t>‹#›</a:t>
+              <a:t>‹Nr.›</a:t>
             </a:fld>
             <a:endParaRPr lang="de-DE"/>
           </a:p>
@@ -8493,7 +8493,7 @@
           <a:p>
             <a:fld id="{D4A7F7FB-B369-497A-97C2-098805D1A52E}" type="datetimeFigureOut">
               <a:rPr lang="de-DE" smtClean="0"/>
-              <a:t>02.01.2022</a:t>
+              <a:t>04.01.22</a:t>
             </a:fld>
             <a:endParaRPr lang="de-DE"/>
           </a:p>
@@ -8607,7 +8607,7 @@
           <a:p>
             <a:fld id="{16A78056-7FAF-464B-A14F-848C7FC2BB44}" type="slidenum">
               <a:rPr lang="de-DE" smtClean="0"/>
-              <a:t>‹#›</a:t>
+              <a:t>‹Nr.›</a:t>
             </a:fld>
             <a:endParaRPr lang="de-DE"/>
           </a:p>
@@ -9120,26 +9120,41 @@
           <a:p>
             <a:r>
               <a:rPr lang="de-DE" sz="1600" dirty="0"/>
-              <a:t>Anton</a:t>
-            </a:r>
+              <a:t>Anton </a:t>
+            </a:r>
+            <a:r>
+              <a:rPr lang="de-DE" sz="1600" dirty="0" err="1"/>
+              <a:t>Kadelbach</a:t>
+            </a:r>
+            <a:endParaRPr lang="de-DE" sz="1600" dirty="0"/>
           </a:p>
           <a:p>
             <a:r>
               <a:rPr lang="de-DE" sz="1600" dirty="0"/>
-              <a:t>Antonia</a:t>
-            </a:r>
+              <a:t>Antonia </a:t>
+            </a:r>
+            <a:r>
+              <a:rPr lang="de-DE" sz="1600" dirty="0" err="1"/>
+              <a:t>Heiming</a:t>
+            </a:r>
+            <a:endParaRPr lang="de-DE" sz="1600" dirty="0"/>
           </a:p>
           <a:p>
             <a:r>
               <a:rPr lang="de-DE" sz="1600" dirty="0"/>
-              <a:t>Arne</a:t>
+              <a:t>Arne Kuchenbecker</a:t>
             </a:r>
           </a:p>
           <a:p>
             <a:r>
               <a:rPr lang="de-DE" sz="1600" dirty="0"/>
-              <a:t>Merlin</a:t>
-            </a:r>
+              <a:t>Merlin </a:t>
+            </a:r>
+            <a:r>
+              <a:rPr lang="de-DE" sz="1600" dirty="0" err="1"/>
+              <a:t>Opp</a:t>
+            </a:r>
+            <a:endParaRPr lang="de-DE" sz="1600" dirty="0"/>
           </a:p>
           <a:p>
             <a:r>

</xml_diff>